<commit_message>
adicionando conteúdo ao relatório
</commit_message>
<xml_diff>
--- a/Documentos/MostraDigitalEPE_modelo-Pesquisa.pptx
+++ b/Documentos/MostraDigitalEPE_modelo-Pesquisa.pptx
@@ -70,8 +70,8 @@
         </p:nvSpPr>
         <p:spPr>
           <a:xfrm>
-            <a:off x="1523880" y="1122480"/>
-            <a:ext cx="9142920" cy="2386440"/>
+            <a:off x="609480" y="273600"/>
+            <a:ext cx="10972440" cy="1144800"/>
           </a:xfrm>
           <a:prstGeom prst="rect">
             <a:avLst/>
@@ -102,7 +102,7 @@
         <p:spPr>
           <a:xfrm>
             <a:off x="609480" y="1604520"/>
-            <a:ext cx="10972080" cy="1896840"/>
+            <a:ext cx="10972440" cy="1896840"/>
           </a:xfrm>
           <a:prstGeom prst="rect">
             <a:avLst/>
@@ -132,7 +132,7 @@
         <p:spPr>
           <a:xfrm>
             <a:off x="609480" y="3682080"/>
-            <a:ext cx="10972080" cy="1896840"/>
+            <a:ext cx="10972440" cy="1896840"/>
           </a:xfrm>
           <a:prstGeom prst="rect">
             <a:avLst/>
@@ -183,8 +183,8 @@
         </p:nvSpPr>
         <p:spPr>
           <a:xfrm>
-            <a:off x="1523880" y="1122480"/>
-            <a:ext cx="9142920" cy="2386440"/>
+            <a:off x="609480" y="273600"/>
+            <a:ext cx="10972440" cy="1144800"/>
           </a:xfrm>
           <a:prstGeom prst="rect">
             <a:avLst/>
@@ -356,8 +356,8 @@
         </p:nvSpPr>
         <p:spPr>
           <a:xfrm>
-            <a:off x="1523880" y="1122480"/>
-            <a:ext cx="9142920" cy="2386440"/>
+            <a:off x="609480" y="273600"/>
+            <a:ext cx="10972440" cy="1144800"/>
           </a:xfrm>
           <a:prstGeom prst="rect">
             <a:avLst/>
@@ -388,7 +388,7 @@
         <p:spPr>
           <a:xfrm>
             <a:off x="609480" y="1604520"/>
-            <a:ext cx="3532680" cy="1896840"/>
+            <a:ext cx="3533040" cy="1896840"/>
           </a:xfrm>
           <a:prstGeom prst="rect">
             <a:avLst/>
@@ -417,8 +417,8 @@
         </p:nvSpPr>
         <p:spPr>
           <a:xfrm>
-            <a:off x="4319280" y="1604520"/>
-            <a:ext cx="3532680" cy="1896840"/>
+            <a:off x="4319640" y="1604520"/>
+            <a:ext cx="3533040" cy="1896840"/>
           </a:xfrm>
           <a:prstGeom prst="rect">
             <a:avLst/>
@@ -447,8 +447,8 @@
         </p:nvSpPr>
         <p:spPr>
           <a:xfrm>
-            <a:off x="8028720" y="1604520"/>
-            <a:ext cx="3532680" cy="1896840"/>
+            <a:off x="8029800" y="1604520"/>
+            <a:ext cx="3533040" cy="1896840"/>
           </a:xfrm>
           <a:prstGeom prst="rect">
             <a:avLst/>
@@ -478,7 +478,7 @@
         <p:spPr>
           <a:xfrm>
             <a:off x="609480" y="3682080"/>
-            <a:ext cx="3532680" cy="1896840"/>
+            <a:ext cx="3533040" cy="1896840"/>
           </a:xfrm>
           <a:prstGeom prst="rect">
             <a:avLst/>
@@ -507,8 +507,8 @@
         </p:nvSpPr>
         <p:spPr>
           <a:xfrm>
-            <a:off x="4319280" y="3682080"/>
-            <a:ext cx="3532680" cy="1896840"/>
+            <a:off x="4319640" y="3682080"/>
+            <a:ext cx="3533040" cy="1896840"/>
           </a:xfrm>
           <a:prstGeom prst="rect">
             <a:avLst/>
@@ -537,8 +537,8 @@
         </p:nvSpPr>
         <p:spPr>
           <a:xfrm>
-            <a:off x="8028720" y="3682080"/>
-            <a:ext cx="3532680" cy="1896840"/>
+            <a:off x="8029800" y="3682080"/>
+            <a:ext cx="3533040" cy="1896840"/>
           </a:xfrm>
           <a:prstGeom prst="rect">
             <a:avLst/>
@@ -589,8 +589,8 @@
         </p:nvSpPr>
         <p:spPr>
           <a:xfrm>
-            <a:off x="1523880" y="1122480"/>
-            <a:ext cx="9142920" cy="2386440"/>
+            <a:off x="609480" y="273600"/>
+            <a:ext cx="10972440" cy="1144800"/>
           </a:xfrm>
           <a:prstGeom prst="rect">
             <a:avLst/>
@@ -621,7 +621,7 @@
         <p:spPr>
           <a:xfrm>
             <a:off x="609480" y="1604520"/>
-            <a:ext cx="10972080" cy="3976920"/>
+            <a:ext cx="10972440" cy="3977280"/>
           </a:xfrm>
           <a:prstGeom prst="rect">
             <a:avLst/>
@@ -673,8 +673,8 @@
         </p:nvSpPr>
         <p:spPr>
           <a:xfrm>
-            <a:off x="1523880" y="1122480"/>
-            <a:ext cx="9142920" cy="2386440"/>
+            <a:off x="609480" y="273600"/>
+            <a:ext cx="10972440" cy="1144800"/>
           </a:xfrm>
           <a:prstGeom prst="rect">
             <a:avLst/>
@@ -705,7 +705,7 @@
         <p:spPr>
           <a:xfrm>
             <a:off x="609480" y="1604520"/>
-            <a:ext cx="10972080" cy="3976920"/>
+            <a:ext cx="10972440" cy="3977280"/>
           </a:xfrm>
           <a:prstGeom prst="rect">
             <a:avLst/>
@@ -756,8 +756,8 @@
         </p:nvSpPr>
         <p:spPr>
           <a:xfrm>
-            <a:off x="1523880" y="1122480"/>
-            <a:ext cx="9142920" cy="2386440"/>
+            <a:off x="609480" y="273600"/>
+            <a:ext cx="10972440" cy="1144800"/>
           </a:xfrm>
           <a:prstGeom prst="rect">
             <a:avLst/>
@@ -788,7 +788,7 @@
         <p:spPr>
           <a:xfrm>
             <a:off x="609480" y="1604520"/>
-            <a:ext cx="5354280" cy="3976920"/>
+            <a:ext cx="5354280" cy="3977280"/>
           </a:xfrm>
           <a:prstGeom prst="rect">
             <a:avLst/>
@@ -818,7 +818,7 @@
         <p:spPr>
           <a:xfrm>
             <a:off x="6231960" y="1604520"/>
-            <a:ext cx="5354280" cy="3976920"/>
+            <a:ext cx="5354280" cy="3977280"/>
           </a:xfrm>
           <a:prstGeom prst="rect">
             <a:avLst/>
@@ -869,8 +869,8 @@
         </p:nvSpPr>
         <p:spPr>
           <a:xfrm>
-            <a:off x="1523880" y="1122480"/>
-            <a:ext cx="9142920" cy="2386440"/>
+            <a:off x="609480" y="273600"/>
+            <a:ext cx="10972440" cy="1144800"/>
           </a:xfrm>
           <a:prstGeom prst="rect">
             <a:avLst/>
@@ -922,8 +922,8 @@
         </p:nvSpPr>
         <p:spPr>
           <a:xfrm>
-            <a:off x="1523880" y="1122480"/>
-            <a:ext cx="9142920" cy="11063520"/>
+            <a:off x="609480" y="273600"/>
+            <a:ext cx="10972440" cy="5307840"/>
           </a:xfrm>
           <a:prstGeom prst="rect">
             <a:avLst/>
@@ -975,8 +975,8 @@
         </p:nvSpPr>
         <p:spPr>
           <a:xfrm>
-            <a:off x="1523880" y="1122480"/>
-            <a:ext cx="9142920" cy="2386440"/>
+            <a:off x="609480" y="273600"/>
+            <a:ext cx="10972440" cy="1144800"/>
           </a:xfrm>
           <a:prstGeom prst="rect">
             <a:avLst/>
@@ -1037,7 +1037,7 @@
         <p:spPr>
           <a:xfrm>
             <a:off x="6231960" y="1604520"/>
-            <a:ext cx="5354280" cy="3976920"/>
+            <a:ext cx="5354280" cy="3977280"/>
           </a:xfrm>
           <a:prstGeom prst="rect">
             <a:avLst/>
@@ -1118,8 +1118,8 @@
         </p:nvSpPr>
         <p:spPr>
           <a:xfrm>
-            <a:off x="1523880" y="1122480"/>
-            <a:ext cx="9142920" cy="2386440"/>
+            <a:off x="609480" y="273600"/>
+            <a:ext cx="10972440" cy="1144800"/>
           </a:xfrm>
           <a:prstGeom prst="rect">
             <a:avLst/>
@@ -1150,7 +1150,7 @@
         <p:spPr>
           <a:xfrm>
             <a:off x="609480" y="1604520"/>
-            <a:ext cx="5354280" cy="3976920"/>
+            <a:ext cx="5354280" cy="3977280"/>
           </a:xfrm>
           <a:prstGeom prst="rect">
             <a:avLst/>
@@ -1261,8 +1261,8 @@
         </p:nvSpPr>
         <p:spPr>
           <a:xfrm>
-            <a:off x="1523880" y="1122480"/>
-            <a:ext cx="9142920" cy="2386440"/>
+            <a:off x="609480" y="273600"/>
+            <a:ext cx="10972440" cy="1144800"/>
           </a:xfrm>
           <a:prstGeom prst="rect">
             <a:avLst/>
@@ -1353,7 +1353,7 @@
         <p:spPr>
           <a:xfrm>
             <a:off x="609480" y="3682080"/>
-            <a:ext cx="10972080" cy="1896840"/>
+            <a:ext cx="10972440" cy="1896840"/>
           </a:xfrm>
           <a:prstGeom prst="rect">
             <a:avLst/>
@@ -1411,8 +1411,8 @@
         </p:nvSpPr>
         <p:spPr>
           <a:xfrm>
-            <a:off x="1523880" y="1122480"/>
-            <a:ext cx="9142920" cy="2386440"/>
+            <a:off x="609480" y="273600"/>
+            <a:ext cx="10972440" cy="1144800"/>
           </a:xfrm>
           <a:prstGeom prst="rect">
             <a:avLst/>
@@ -1425,12 +1425,12 @@
           <a:p>
             <a:pPr algn="ctr"/>
             <a:r>
-              <a:rPr b="0" lang="pt-BR" sz="1800" spc="-1" strike="noStrike">
+              <a:rPr b="0" lang="pt-BR" sz="4400" spc="-1" strike="noStrike">
                 <a:latin typeface="Arial"/>
               </a:rPr>
               <a:t>Click to edit the title text format</a:t>
             </a:r>
-            <a:endParaRPr b="0" lang="pt-BR" sz="1800" spc="-1" strike="noStrike">
+            <a:endParaRPr b="0" lang="pt-BR" sz="4400" spc="-1" strike="noStrike">
               <a:latin typeface="Arial"/>
             </a:endParaRPr>
           </a:p>
@@ -1449,7 +1449,7 @@
         <p:spPr>
           <a:xfrm>
             <a:off x="609480" y="1604520"/>
-            <a:ext cx="10972080" cy="3976920"/>
+            <a:ext cx="10972440" cy="3977280"/>
           </a:xfrm>
           <a:prstGeom prst="rect">
             <a:avLst/>
@@ -1460,7 +1460,7 @@
             <a:normAutofit/>
           </a:bodyPr>
           <a:p>
-            <a:pPr marL="432000" indent="-324000" algn="ctr">
+            <a:pPr marL="432000" indent="-324000">
               <a:spcBef>
                 <a:spcPts val="1417"/>
               </a:spcBef>
@@ -1472,17 +1472,17 @@
               <a:buChar char=""/>
             </a:pPr>
             <a:r>
-              <a:rPr b="0" lang="pt-BR" sz="1800" spc="-1" strike="noStrike">
+              <a:rPr b="0" lang="pt-BR" sz="3200" spc="-1" strike="noStrike">
                 <a:latin typeface="Arial"/>
               </a:rPr>
               <a:t>Click to edit the outline text format</a:t>
             </a:r>
-            <a:endParaRPr b="0" lang="pt-BR" sz="1800" spc="-1" strike="noStrike">
-              <a:latin typeface="Arial"/>
-            </a:endParaRPr>
-          </a:p>
-          <a:p>
-            <a:pPr lvl="1" marL="864000" indent="-324000" algn="ctr">
+            <a:endParaRPr b="0" lang="pt-BR" sz="3200" spc="-1" strike="noStrike">
+              <a:latin typeface="Arial"/>
+            </a:endParaRPr>
+          </a:p>
+          <a:p>
+            <a:pPr lvl="1" marL="864000" indent="-324000">
               <a:spcBef>
                 <a:spcPts val="1134"/>
               </a:spcBef>
@@ -1494,17 +1494,17 @@
               <a:buChar char=""/>
             </a:pPr>
             <a:r>
-              <a:rPr b="0" lang="pt-BR" sz="1800" spc="-1" strike="noStrike">
+              <a:rPr b="0" lang="pt-BR" sz="2800" spc="-1" strike="noStrike">
                 <a:latin typeface="Arial"/>
               </a:rPr>
               <a:t>Second Outline Level</a:t>
             </a:r>
-            <a:endParaRPr b="0" lang="pt-BR" sz="1800" spc="-1" strike="noStrike">
-              <a:latin typeface="Arial"/>
-            </a:endParaRPr>
-          </a:p>
-          <a:p>
-            <a:pPr lvl="2" marL="1296000" indent="-288000" algn="ctr">
+            <a:endParaRPr b="0" lang="pt-BR" sz="2800" spc="-1" strike="noStrike">
+              <a:latin typeface="Arial"/>
+            </a:endParaRPr>
+          </a:p>
+          <a:p>
+            <a:pPr lvl="2" marL="1296000" indent="-288000">
               <a:spcBef>
                 <a:spcPts val="850"/>
               </a:spcBef>
@@ -1516,17 +1516,17 @@
               <a:buChar char=""/>
             </a:pPr>
             <a:r>
-              <a:rPr b="0" lang="pt-BR" sz="1800" spc="-1" strike="noStrike">
+              <a:rPr b="0" lang="pt-BR" sz="2400" spc="-1" strike="noStrike">
                 <a:latin typeface="Arial"/>
               </a:rPr>
               <a:t>Third Outline Level</a:t>
             </a:r>
-            <a:endParaRPr b="0" lang="pt-BR" sz="1800" spc="-1" strike="noStrike">
-              <a:latin typeface="Arial"/>
-            </a:endParaRPr>
-          </a:p>
-          <a:p>
-            <a:pPr lvl="3" marL="1728000" indent="-216000" algn="ctr">
+            <a:endParaRPr b="0" lang="pt-BR" sz="2400" spc="-1" strike="noStrike">
+              <a:latin typeface="Arial"/>
+            </a:endParaRPr>
+          </a:p>
+          <a:p>
+            <a:pPr lvl="3" marL="1728000" indent="-216000">
               <a:spcBef>
                 <a:spcPts val="567"/>
               </a:spcBef>
@@ -1538,17 +1538,17 @@
               <a:buChar char=""/>
             </a:pPr>
             <a:r>
-              <a:rPr b="0" lang="pt-BR" sz="1800" spc="-1" strike="noStrike">
+              <a:rPr b="0" lang="pt-BR" sz="2000" spc="-1" strike="noStrike">
                 <a:latin typeface="Arial"/>
               </a:rPr>
               <a:t>Fourth Outline Level</a:t>
             </a:r>
-            <a:endParaRPr b="0" lang="pt-BR" sz="1800" spc="-1" strike="noStrike">
-              <a:latin typeface="Arial"/>
-            </a:endParaRPr>
-          </a:p>
-          <a:p>
-            <a:pPr lvl="4" marL="2160000" indent="-216000" algn="ctr">
+            <a:endParaRPr b="0" lang="pt-BR" sz="2000" spc="-1" strike="noStrike">
+              <a:latin typeface="Arial"/>
+            </a:endParaRPr>
+          </a:p>
+          <a:p>
+            <a:pPr lvl="4" marL="2160000" indent="-216000">
               <a:spcBef>
                 <a:spcPts val="283"/>
               </a:spcBef>
@@ -1560,17 +1560,17 @@
               <a:buChar char=""/>
             </a:pPr>
             <a:r>
-              <a:rPr b="0" lang="pt-BR" sz="1800" spc="-1" strike="noStrike">
+              <a:rPr b="0" lang="pt-BR" sz="2000" spc="-1" strike="noStrike">
                 <a:latin typeface="Arial"/>
               </a:rPr>
               <a:t>Fifth Outline Level</a:t>
             </a:r>
-            <a:endParaRPr b="0" lang="pt-BR" sz="1800" spc="-1" strike="noStrike">
-              <a:latin typeface="Arial"/>
-            </a:endParaRPr>
-          </a:p>
-          <a:p>
-            <a:pPr lvl="5" marL="2592000" indent="-216000" algn="ctr">
+            <a:endParaRPr b="0" lang="pt-BR" sz="2000" spc="-1" strike="noStrike">
+              <a:latin typeface="Arial"/>
+            </a:endParaRPr>
+          </a:p>
+          <a:p>
+            <a:pPr lvl="5" marL="2592000" indent="-216000">
               <a:spcBef>
                 <a:spcPts val="283"/>
               </a:spcBef>
@@ -1582,17 +1582,17 @@
               <a:buChar char=""/>
             </a:pPr>
             <a:r>
-              <a:rPr b="0" lang="pt-BR" sz="1800" spc="-1" strike="noStrike">
+              <a:rPr b="0" lang="pt-BR" sz="2000" spc="-1" strike="noStrike">
                 <a:latin typeface="Arial"/>
               </a:rPr>
               <a:t>Sixth Outline Level</a:t>
             </a:r>
-            <a:endParaRPr b="0" lang="pt-BR" sz="1800" spc="-1" strike="noStrike">
-              <a:latin typeface="Arial"/>
-            </a:endParaRPr>
-          </a:p>
-          <a:p>
-            <a:pPr lvl="6" marL="3024000" indent="-216000" algn="ctr">
+            <a:endParaRPr b="0" lang="pt-BR" sz="2000" spc="-1" strike="noStrike">
+              <a:latin typeface="Arial"/>
+            </a:endParaRPr>
+          </a:p>
+          <a:p>
+            <a:pPr lvl="6" marL="3024000" indent="-216000">
               <a:spcBef>
                 <a:spcPts val="283"/>
               </a:spcBef>
@@ -1604,12 +1604,12 @@
               <a:buChar char=""/>
             </a:pPr>
             <a:r>
-              <a:rPr b="0" lang="pt-BR" sz="1800" spc="-1" strike="noStrike">
+              <a:rPr b="0" lang="pt-BR" sz="2000" spc="-1" strike="noStrike">
                 <a:latin typeface="Arial"/>
               </a:rPr>
               <a:t>Seventh Outline Level</a:t>
             </a:r>
-            <a:endParaRPr b="0" lang="pt-BR" sz="1800" spc="-1" strike="noStrike">
+            <a:endParaRPr b="0" lang="pt-BR" sz="2000" spc="-1" strike="noStrike">
               <a:latin typeface="Arial"/>
             </a:endParaRPr>
           </a:p>
@@ -1661,7 +1661,7 @@
         <p:spPr>
           <a:xfrm>
             <a:off x="0" y="1677600"/>
-            <a:ext cx="12165840" cy="5179320"/>
+            <a:ext cx="12165480" cy="5178960"/>
           </a:xfrm>
           <a:prstGeom prst="rect">
             <a:avLst/>
@@ -1697,7 +1697,7 @@
         <p:spPr>
           <a:xfrm>
             <a:off x="24840" y="5154120"/>
-            <a:ext cx="12165840" cy="1235160"/>
+            <a:ext cx="12165480" cy="1235160"/>
           </a:xfrm>
           <a:prstGeom prst="rect">
             <a:avLst/>
@@ -1793,7 +1793,7 @@
         <p:spPr>
           <a:xfrm>
             <a:off x="0" y="3429000"/>
-            <a:ext cx="12165840" cy="1724040"/>
+            <a:ext cx="12165480" cy="1723680"/>
           </a:xfrm>
           <a:prstGeom prst="rect">
             <a:avLst/>
@@ -1848,7 +1848,7 @@
         <p:spPr>
           <a:xfrm>
             <a:off x="2303640" y="0"/>
-            <a:ext cx="7608240" cy="3334320"/>
+            <a:ext cx="7607880" cy="3333960"/>
           </a:xfrm>
           <a:prstGeom prst="rect">
             <a:avLst/>
@@ -1897,7 +1897,7 @@
         <p:spPr>
           <a:xfrm>
             <a:off x="0" y="6318000"/>
-            <a:ext cx="12191040" cy="538920"/>
+            <a:ext cx="12190680" cy="538560"/>
           </a:xfrm>
           <a:prstGeom prst="rect">
             <a:avLst/>
@@ -1933,7 +1933,7 @@
         <p:spPr>
           <a:xfrm>
             <a:off x="122760" y="6318000"/>
-            <a:ext cx="9938880" cy="538920"/>
+            <a:ext cx="9938520" cy="538560"/>
           </a:xfrm>
           <a:prstGeom prst="rect">
             <a:avLst/>
@@ -1984,7 +1984,7 @@
         <p:spPr>
           <a:xfrm>
             <a:off x="341280" y="331560"/>
-            <a:ext cx="11463120" cy="5987880"/>
+            <a:ext cx="11462760" cy="5987520"/>
           </a:xfrm>
           <a:prstGeom prst="rect">
             <a:avLst/>
@@ -2323,7 +2323,7 @@
         <p:spPr>
           <a:xfrm>
             <a:off x="9761400" y="5808600"/>
-            <a:ext cx="2402280" cy="1052280"/>
+            <a:ext cx="2401920" cy="1051920"/>
           </a:xfrm>
           <a:prstGeom prst="rect">
             <a:avLst/>
@@ -2372,7 +2372,7 @@
         <p:spPr>
           <a:xfrm>
             <a:off x="0" y="6318000"/>
-            <a:ext cx="12191040" cy="538920"/>
+            <a:ext cx="12190680" cy="538560"/>
           </a:xfrm>
           <a:prstGeom prst="rect">
             <a:avLst/>
@@ -2408,7 +2408,7 @@
         <p:spPr>
           <a:xfrm>
             <a:off x="122760" y="6318000"/>
-            <a:ext cx="9938880" cy="538920"/>
+            <a:ext cx="9938520" cy="538560"/>
           </a:xfrm>
           <a:prstGeom prst="rect">
             <a:avLst/>
@@ -2459,7 +2459,7 @@
         <p:spPr>
           <a:xfrm>
             <a:off x="341280" y="486360"/>
-            <a:ext cx="11463120" cy="3107160"/>
+            <a:ext cx="11462760" cy="3107160"/>
           </a:xfrm>
           <a:prstGeom prst="rect">
             <a:avLst/>
@@ -2566,7 +2566,7 @@
         <p:spPr>
           <a:xfrm>
             <a:off x="9761400" y="5808600"/>
-            <a:ext cx="2402280" cy="1052280"/>
+            <a:ext cx="2401920" cy="1051920"/>
           </a:xfrm>
           <a:prstGeom prst="rect">
             <a:avLst/>
@@ -2589,7 +2589,7 @@
         <p:spPr>
           <a:xfrm>
             <a:off x="720000" y="2842920"/>
-            <a:ext cx="3239280" cy="3456360"/>
+            <a:ext cx="3238920" cy="3456000"/>
           </a:xfrm>
           <a:prstGeom prst="rect">
             <a:avLst/>
@@ -2608,7 +2608,7 @@
         <p:spPr>
           <a:xfrm>
             <a:off x="4140000" y="2880000"/>
-            <a:ext cx="7739280" cy="3159720"/>
+            <a:ext cx="7738920" cy="3159360"/>
           </a:xfrm>
           <a:prstGeom prst="rect">
             <a:avLst/>
@@ -2715,7 +2715,7 @@
         <p:spPr>
           <a:xfrm>
             <a:off x="0" y="6318000"/>
-            <a:ext cx="12191040" cy="538920"/>
+            <a:ext cx="12190680" cy="538560"/>
           </a:xfrm>
           <a:prstGeom prst="rect">
             <a:avLst/>
@@ -2751,7 +2751,7 @@
         <p:spPr>
           <a:xfrm>
             <a:off x="122760" y="6318000"/>
-            <a:ext cx="9938880" cy="538920"/>
+            <a:ext cx="9938520" cy="538560"/>
           </a:xfrm>
           <a:prstGeom prst="rect">
             <a:avLst/>
@@ -2802,7 +2802,7 @@
         <p:spPr>
           <a:xfrm>
             <a:off x="341280" y="486360"/>
-            <a:ext cx="11463120" cy="5576400"/>
+            <a:ext cx="11462760" cy="5576040"/>
           </a:xfrm>
           <a:prstGeom prst="rect">
             <a:avLst/>
@@ -3056,7 +3056,7 @@
         <p:spPr>
           <a:xfrm>
             <a:off x="9761400" y="5808600"/>
-            <a:ext cx="2402280" cy="1052280"/>
+            <a:ext cx="2401920" cy="1051920"/>
           </a:xfrm>
           <a:prstGeom prst="rect">
             <a:avLst/>
@@ -3105,7 +3105,7 @@
         <p:spPr>
           <a:xfrm>
             <a:off x="0" y="6318000"/>
-            <a:ext cx="12191040" cy="538920"/>
+            <a:ext cx="12190680" cy="538560"/>
           </a:xfrm>
           <a:prstGeom prst="rect">
             <a:avLst/>
@@ -3141,7 +3141,7 @@
         <p:spPr>
           <a:xfrm>
             <a:off x="122760" y="6318000"/>
-            <a:ext cx="9938880" cy="538920"/>
+            <a:ext cx="9938520" cy="538560"/>
           </a:xfrm>
           <a:prstGeom prst="rect">
             <a:avLst/>
@@ -3192,7 +3192,7 @@
         <p:spPr>
           <a:xfrm>
             <a:off x="341280" y="486360"/>
-            <a:ext cx="11463120" cy="4615920"/>
+            <a:ext cx="11462760" cy="4615920"/>
           </a:xfrm>
           <a:prstGeom prst="rect">
             <a:avLst/>
@@ -3608,7 +3608,7 @@
         <p:spPr>
           <a:xfrm>
             <a:off x="9761400" y="5808600"/>
-            <a:ext cx="2402280" cy="1052280"/>
+            <a:ext cx="2401920" cy="1051920"/>
           </a:xfrm>
           <a:prstGeom prst="rect">
             <a:avLst/>
@@ -3931,7 +3931,7 @@
         <p:spPr>
           <a:xfrm>
             <a:off x="360000" y="4878360"/>
-            <a:ext cx="11159280" cy="1240920"/>
+            <a:ext cx="11158920" cy="1240560"/>
           </a:xfrm>
           <a:prstGeom prst="rect">
             <a:avLst/>
@@ -4015,7 +4015,7 @@
         <p:spPr>
           <a:xfrm>
             <a:off x="0" y="6318000"/>
-            <a:ext cx="12191040" cy="538920"/>
+            <a:ext cx="12190680" cy="538560"/>
           </a:xfrm>
           <a:prstGeom prst="rect">
             <a:avLst/>
@@ -4051,7 +4051,7 @@
         <p:spPr>
           <a:xfrm>
             <a:off x="122760" y="6318000"/>
-            <a:ext cx="9938880" cy="538920"/>
+            <a:ext cx="9938520" cy="538560"/>
           </a:xfrm>
           <a:prstGeom prst="rect">
             <a:avLst/>
@@ -4102,7 +4102,7 @@
         <p:spPr>
           <a:xfrm>
             <a:off x="341280" y="-13680"/>
-            <a:ext cx="11463120" cy="3792960"/>
+            <a:ext cx="11462760" cy="3792960"/>
           </a:xfrm>
           <a:prstGeom prst="rect">
             <a:avLst/>
@@ -4206,7 +4206,7 @@
         <p:spPr>
           <a:xfrm>
             <a:off x="9761400" y="5808600"/>
-            <a:ext cx="2402280" cy="1052280"/>
+            <a:ext cx="2401920" cy="1051920"/>
           </a:xfrm>
           <a:prstGeom prst="rect">
             <a:avLst/>
@@ -4229,7 +4229,7 @@
         <p:spPr>
           <a:xfrm>
             <a:off x="5220000" y="3400920"/>
-            <a:ext cx="4503600" cy="2916360"/>
+            <a:ext cx="4503240" cy="2916000"/>
           </a:xfrm>
           <a:prstGeom prst="rect">
             <a:avLst/>
@@ -4248,7 +4248,7 @@
         <p:spPr>
           <a:xfrm>
             <a:off x="360000" y="3960000"/>
-            <a:ext cx="4679280" cy="2159280"/>
+            <a:ext cx="4678920" cy="2158920"/>
           </a:xfrm>
           <a:prstGeom prst="rect">
             <a:avLst/>
@@ -4332,7 +4332,7 @@
         <p:spPr>
           <a:xfrm>
             <a:off x="0" y="6318000"/>
-            <a:ext cx="12191040" cy="538920"/>
+            <a:ext cx="12190680" cy="538560"/>
           </a:xfrm>
           <a:prstGeom prst="rect">
             <a:avLst/>
@@ -4368,7 +4368,7 @@
         <p:spPr>
           <a:xfrm>
             <a:off x="122760" y="6318000"/>
-            <a:ext cx="9938880" cy="538920"/>
+            <a:ext cx="9938520" cy="538560"/>
           </a:xfrm>
           <a:prstGeom prst="rect">
             <a:avLst/>
@@ -4419,7 +4419,7 @@
         <p:spPr>
           <a:xfrm>
             <a:off x="341280" y="486360"/>
-            <a:ext cx="11463120" cy="4478760"/>
+            <a:ext cx="11462760" cy="4478760"/>
           </a:xfrm>
           <a:prstGeom prst="rect">
             <a:avLst/>
@@ -4638,7 +4638,7 @@
         <p:spPr>
           <a:xfrm>
             <a:off x="9761400" y="5808600"/>
-            <a:ext cx="2402280" cy="1052280"/>
+            <a:ext cx="2401920" cy="1051920"/>
           </a:xfrm>
           <a:prstGeom prst="rect">
             <a:avLst/>
@@ -4687,7 +4687,7 @@
         <p:spPr>
           <a:xfrm>
             <a:off x="0" y="6318000"/>
-            <a:ext cx="12191040" cy="538920"/>
+            <a:ext cx="12190680" cy="538560"/>
           </a:xfrm>
           <a:prstGeom prst="rect">
             <a:avLst/>
@@ -4723,7 +4723,7 @@
         <p:spPr>
           <a:xfrm>
             <a:off x="122760" y="6318000"/>
-            <a:ext cx="9938880" cy="538920"/>
+            <a:ext cx="9938520" cy="538560"/>
           </a:xfrm>
           <a:prstGeom prst="rect">
             <a:avLst/>
@@ -4774,7 +4774,7 @@
         <p:spPr>
           <a:xfrm>
             <a:off x="341280" y="486360"/>
-            <a:ext cx="11463120" cy="4478760"/>
+            <a:ext cx="11462760" cy="4478760"/>
           </a:xfrm>
           <a:prstGeom prst="rect">
             <a:avLst/>
@@ -5057,7 +5057,7 @@
         <p:spPr>
           <a:xfrm>
             <a:off x="9761400" y="5808600"/>
-            <a:ext cx="2402280" cy="1052280"/>
+            <a:ext cx="2401920" cy="1051920"/>
           </a:xfrm>
           <a:prstGeom prst="rect">
             <a:avLst/>

</xml_diff>